<commit_message>
Update presentation and README.md files
</commit_message>
<xml_diff>
--- a/documents/Presentation.pptx
+++ b/documents/Presentation.pptx
@@ -18,22 +18,22 @@
   <p:notesSz cx="6858000" cy="9144000"/>
   <p:embeddedFontLst>
     <p:embeddedFont>
+      <p:font typeface="Concert One" panose="020B0604020202020204" charset="0"/>
+      <p:regular r:id="rId10"/>
+    </p:embeddedFont>
+    <p:embeddedFont>
       <p:font typeface="Archivo" panose="020B0604020202020204" charset="0"/>
-      <p:regular r:id="rId10"/>
-      <p:bold r:id="rId11"/>
-      <p:italic r:id="rId12"/>
-      <p:boldItalic r:id="rId13"/>
+      <p:regular r:id="rId11"/>
+      <p:bold r:id="rId12"/>
+      <p:italic r:id="rId13"/>
+      <p:boldItalic r:id="rId14"/>
     </p:embeddedFont>
     <p:embeddedFont>
       <p:font typeface="Proxima Nova" panose="020B0604020202020204" charset="0"/>
-      <p:regular r:id="rId14"/>
-      <p:bold r:id="rId15"/>
-      <p:italic r:id="rId16"/>
-      <p:boldItalic r:id="rId17"/>
-    </p:embeddedFont>
-    <p:embeddedFont>
-      <p:font typeface="Concert One" panose="020B0604020202020204" charset="0"/>
-      <p:regular r:id="rId18"/>
+      <p:regular r:id="rId15"/>
+      <p:bold r:id="rId16"/>
+      <p:italic r:id="rId17"/>
+      <p:boldItalic r:id="rId18"/>
     </p:embeddedFont>
   </p:embeddedFontLst>
   <p:defaultTextStyle>
@@ -1213,19 +1213,7 @@
             <a:rPr lang="en-US" sz="1800" dirty="0" smtClean="0">
               <a:latin typeface="Concert One" panose="020B0604020202020204" charset="0"/>
             </a:rPr>
-            <a:t>We </a:t>
-          </a:r>
-          <a:r>
-            <a:rPr lang="en-US" sz="1800" dirty="0" smtClean="0">
-              <a:latin typeface="Concert One" panose="020B0604020202020204" charset="0"/>
-            </a:rPr>
-            <a:t>created </a:t>
-          </a:r>
-          <a:r>
-            <a:rPr lang="en-US" sz="1800" dirty="0" smtClean="0">
-              <a:latin typeface="Concert One" panose="020B0604020202020204" charset="0"/>
-            </a:rPr>
-            <a:t>a logo</a:t>
+            <a:t>We created a logo</a:t>
           </a:r>
           <a:endParaRPr lang="en-US" sz="1800" dirty="0">
             <a:latin typeface="Concert One" panose="020B0604020202020204" charset="0"/>
@@ -1372,13 +1360,7 @@
             <a:rPr lang="en-US" sz="1800" smtClean="0">
               <a:latin typeface="Concert One" panose="020B0604020202020204" charset="0"/>
             </a:rPr>
-            <a:t>We </a:t>
-          </a:r>
-          <a:r>
-            <a:rPr lang="en-US" sz="1800" smtClean="0">
-              <a:latin typeface="Concert One" panose="020B0604020202020204" charset="0"/>
-            </a:rPr>
-            <a:t>created </a:t>
+            <a:t>We created </a:t>
           </a:r>
           <a:r>
             <a:rPr lang="en-US" sz="1800" dirty="0" smtClean="0">
@@ -1632,29 +1614,29 @@
     </dgm:pt>
   </dgm:ptLst>
   <dgm:cxnLst>
-    <dgm:cxn modelId="{9CEA1891-24F1-4A69-BA19-7453A09638FD}" type="presOf" srcId="{3B7F35E3-D35F-4E9A-9D4A-210DA025A0F0}" destId="{9BA1D382-6DE6-48B7-988E-C9F5113915EE}" srcOrd="0" destOrd="0" presId="urn:microsoft.com/office/officeart/2005/8/layout/process5"/>
-    <dgm:cxn modelId="{65321A91-68A6-49D7-817C-D1EC4AC29687}" type="presOf" srcId="{6E14D921-8A95-4916-B927-3F1181CF9F40}" destId="{5E8867D7-D22F-49AF-9B89-9AC14724801F}" srcOrd="1" destOrd="0" presId="urn:microsoft.com/office/officeart/2005/8/layout/process5"/>
-    <dgm:cxn modelId="{FDFCE99B-9942-44DE-A877-6745FC65B888}" srcId="{46294476-EBC3-4585-A1D4-AFEB26E81FA8}" destId="{27604B0E-F101-4866-87CF-8F000CB2E483}" srcOrd="0" destOrd="0" parTransId="{8A962511-4115-44F3-8626-2C4C20FF4B84}" sibTransId="{3508E934-413A-4C30-A27A-91CF65273019}"/>
-    <dgm:cxn modelId="{445BD231-4DE1-4396-93FD-98F3873501FF}" type="presOf" srcId="{06142C71-73D2-4457-B990-03D5273DBD5E}" destId="{266A6F8B-BD19-4CA1-8F69-3ECDE410FB8E}" srcOrd="0" destOrd="0" presId="urn:microsoft.com/office/officeart/2005/8/layout/process5"/>
-    <dgm:cxn modelId="{D3495FB0-FE93-4A23-9D0B-FBF759719D47}" srcId="{46294476-EBC3-4585-A1D4-AFEB26E81FA8}" destId="{8190FA22-BEAD-4725-8BB8-9BF485F358F8}" srcOrd="1" destOrd="0" parTransId="{1050350E-DFAB-4971-B006-03329DA189F4}" sibTransId="{844773CE-66CB-4FB7-A3D8-8F2009EABB45}"/>
-    <dgm:cxn modelId="{879A9DE9-815B-450B-9BD6-FAC7A971AAD6}" type="presOf" srcId="{6E14D921-8A95-4916-B927-3F1181CF9F40}" destId="{F72BC9D7-1160-48F4-B490-15C7F428B09A}" srcOrd="0" destOrd="0" presId="urn:microsoft.com/office/officeart/2005/8/layout/process5"/>
-    <dgm:cxn modelId="{042B8995-5618-4BE7-ADF7-54182C8F9CC9}" type="presOf" srcId="{05E30910-C2ED-4BBE-91A8-DDEC4503E85A}" destId="{2FB6F846-B183-4C74-8774-9E58C969A4E1}" srcOrd="1" destOrd="0" presId="urn:microsoft.com/office/officeart/2005/8/layout/process5"/>
-    <dgm:cxn modelId="{C5A77FE7-1C12-4FA7-9BA2-1BA59C5F18AA}" type="presOf" srcId="{844773CE-66CB-4FB7-A3D8-8F2009EABB45}" destId="{D65855CC-5EAA-455A-BED4-E611C5BA03BB}" srcOrd="0" destOrd="0" presId="urn:microsoft.com/office/officeart/2005/8/layout/process5"/>
-    <dgm:cxn modelId="{B6C03173-D6AD-4FF1-A432-CE43EDEFA781}" type="presOf" srcId="{F98F64DC-5C79-47C2-85CB-34B007AC568C}" destId="{3C7F90F0-BE81-4901-BABB-49C86CCD2CBC}" srcOrd="0" destOrd="0" presId="urn:microsoft.com/office/officeart/2005/8/layout/process5"/>
-    <dgm:cxn modelId="{7B4B85ED-0078-4E38-9902-EC48142DE929}" type="presOf" srcId="{A979148E-58DE-4F39-A2D3-C4FB9A083EF9}" destId="{1BBA0522-5533-4FC3-A641-AC225D16844B}" srcOrd="0" destOrd="0" presId="urn:microsoft.com/office/officeart/2005/8/layout/process5"/>
-    <dgm:cxn modelId="{A8C9A9A9-27C4-4360-BA2C-1BEF3990401E}" type="presOf" srcId="{844773CE-66CB-4FB7-A3D8-8F2009EABB45}" destId="{114B6121-1C91-44EE-B9C2-37B6132AAF7F}" srcOrd="1" destOrd="0" presId="urn:microsoft.com/office/officeart/2005/8/layout/process5"/>
-    <dgm:cxn modelId="{DCA5CEF5-EDC7-47D5-818A-0C7FBEA3ABB9}" srcId="{46294476-EBC3-4585-A1D4-AFEB26E81FA8}" destId="{06142C71-73D2-4457-B990-03D5273DBD5E}" srcOrd="3" destOrd="0" parTransId="{4C9AC614-0F7F-4B07-A4B0-6520F9D617FA}" sibTransId="{6E14D921-8A95-4916-B927-3F1181CF9F40}"/>
-    <dgm:cxn modelId="{B744C08E-DAF4-46F6-A2C6-3DDCCC2F3E7C}" type="presOf" srcId="{05E30910-C2ED-4BBE-91A8-DDEC4503E85A}" destId="{5621AC5D-7545-4D3B-AFEB-2954560C8A82}" srcOrd="0" destOrd="0" presId="urn:microsoft.com/office/officeart/2005/8/layout/process5"/>
     <dgm:cxn modelId="{F94764D9-C2AC-49D8-8B32-9AB467654802}" type="presOf" srcId="{27604B0E-F101-4866-87CF-8F000CB2E483}" destId="{0AE25DDD-6D4A-4484-BB9E-CF8F071F96B7}" srcOrd="0" destOrd="0" presId="urn:microsoft.com/office/officeart/2005/8/layout/process5"/>
     <dgm:cxn modelId="{C948280A-517F-4AA0-A5BB-62B4C011BF89}" type="presOf" srcId="{46294476-EBC3-4585-A1D4-AFEB26E81FA8}" destId="{96CC5194-ED48-4286-AB7D-84D0C8A0D8D7}" srcOrd="0" destOrd="0" presId="urn:microsoft.com/office/officeart/2005/8/layout/process5"/>
+    <dgm:cxn modelId="{483F018F-A4FE-4E83-92C5-B7A935B365B5}" type="presOf" srcId="{3508E934-413A-4C30-A27A-91CF65273019}" destId="{CAC7E472-CD66-4791-AA50-4E093276C9C0}" srcOrd="1" destOrd="0" presId="urn:microsoft.com/office/officeart/2005/8/layout/process5"/>
+    <dgm:cxn modelId="{9CEA1891-24F1-4A69-BA19-7453A09638FD}" type="presOf" srcId="{3B7F35E3-D35F-4E9A-9D4A-210DA025A0F0}" destId="{9BA1D382-6DE6-48B7-988E-C9F5113915EE}" srcOrd="0" destOrd="0" presId="urn:microsoft.com/office/officeart/2005/8/layout/process5"/>
+    <dgm:cxn modelId="{9CD242BE-7699-4B50-8BC9-ABA6B6C20349}" srcId="{46294476-EBC3-4585-A1D4-AFEB26E81FA8}" destId="{F98F64DC-5C79-47C2-85CB-34B007AC568C}" srcOrd="2" destOrd="0" parTransId="{0CD1AB90-077B-40A8-B908-18532FC0FB31}" sibTransId="{05E30910-C2ED-4BBE-91A8-DDEC4503E85A}"/>
+    <dgm:cxn modelId="{D3495FB0-FE93-4A23-9D0B-FBF759719D47}" srcId="{46294476-EBC3-4585-A1D4-AFEB26E81FA8}" destId="{8190FA22-BEAD-4725-8BB8-9BF485F358F8}" srcOrd="1" destOrd="0" parTransId="{1050350E-DFAB-4971-B006-03329DA189F4}" sibTransId="{844773CE-66CB-4FB7-A3D8-8F2009EABB45}"/>
+    <dgm:cxn modelId="{B744C08E-DAF4-46F6-A2C6-3DDCCC2F3E7C}" type="presOf" srcId="{05E30910-C2ED-4BBE-91A8-DDEC4503E85A}" destId="{5621AC5D-7545-4D3B-AFEB-2954560C8A82}" srcOrd="0" destOrd="0" presId="urn:microsoft.com/office/officeart/2005/8/layout/process5"/>
+    <dgm:cxn modelId="{B6C03173-D6AD-4FF1-A432-CE43EDEFA781}" type="presOf" srcId="{F98F64DC-5C79-47C2-85CB-34B007AC568C}" destId="{3C7F90F0-BE81-4901-BABB-49C86CCD2CBC}" srcOrd="0" destOrd="0" presId="urn:microsoft.com/office/officeart/2005/8/layout/process5"/>
+    <dgm:cxn modelId="{879A9DE9-815B-450B-9BD6-FAC7A971AAD6}" type="presOf" srcId="{6E14D921-8A95-4916-B927-3F1181CF9F40}" destId="{F72BC9D7-1160-48F4-B490-15C7F428B09A}" srcOrd="0" destOrd="0" presId="urn:microsoft.com/office/officeart/2005/8/layout/process5"/>
+    <dgm:cxn modelId="{A8C9A9A9-27C4-4360-BA2C-1BEF3990401E}" type="presOf" srcId="{844773CE-66CB-4FB7-A3D8-8F2009EABB45}" destId="{114B6121-1C91-44EE-B9C2-37B6132AAF7F}" srcOrd="1" destOrd="0" presId="urn:microsoft.com/office/officeart/2005/8/layout/process5"/>
+    <dgm:cxn modelId="{AF75CF08-AC42-44AE-875C-8F9DBE620CD7}" type="presOf" srcId="{A979148E-58DE-4F39-A2D3-C4FB9A083EF9}" destId="{BD004D4B-C15A-48AE-8345-BA2C66903EBF}" srcOrd="1" destOrd="0" presId="urn:microsoft.com/office/officeart/2005/8/layout/process5"/>
+    <dgm:cxn modelId="{F53046DE-E516-4068-8692-6D57137E26A2}" srcId="{46294476-EBC3-4585-A1D4-AFEB26E81FA8}" destId="{0C8489BF-5B3B-4F4D-82B9-2A8ED6A33555}" srcOrd="5" destOrd="0" parTransId="{F5F8D56A-447C-4E62-879F-5DCB389B4DC9}" sibTransId="{AE67F6A8-1921-4B9D-A569-D30F6B2CFA90}"/>
+    <dgm:cxn modelId="{0FE0F3B0-C6BC-432D-8C36-95066C6DDA4A}" type="presOf" srcId="{8190FA22-BEAD-4725-8BB8-9BF485F358F8}" destId="{48F045BD-0FA8-4875-8C34-CA481ECE6C59}" srcOrd="0" destOrd="0" presId="urn:microsoft.com/office/officeart/2005/8/layout/process5"/>
+    <dgm:cxn modelId="{042B8995-5618-4BE7-ADF7-54182C8F9CC9}" type="presOf" srcId="{05E30910-C2ED-4BBE-91A8-DDEC4503E85A}" destId="{2FB6F846-B183-4C74-8774-9E58C969A4E1}" srcOrd="1" destOrd="0" presId="urn:microsoft.com/office/officeart/2005/8/layout/process5"/>
+    <dgm:cxn modelId="{DCA5CEF5-EDC7-47D5-818A-0C7FBEA3ABB9}" srcId="{46294476-EBC3-4585-A1D4-AFEB26E81FA8}" destId="{06142C71-73D2-4457-B990-03D5273DBD5E}" srcOrd="3" destOrd="0" parTransId="{4C9AC614-0F7F-4B07-A4B0-6520F9D617FA}" sibTransId="{6E14D921-8A95-4916-B927-3F1181CF9F40}"/>
+    <dgm:cxn modelId="{65321A91-68A6-49D7-817C-D1EC4AC29687}" type="presOf" srcId="{6E14D921-8A95-4916-B927-3F1181CF9F40}" destId="{5E8867D7-D22F-49AF-9B89-9AC14724801F}" srcOrd="1" destOrd="0" presId="urn:microsoft.com/office/officeart/2005/8/layout/process5"/>
+    <dgm:cxn modelId="{C5A77FE7-1C12-4FA7-9BA2-1BA59C5F18AA}" type="presOf" srcId="{844773CE-66CB-4FB7-A3D8-8F2009EABB45}" destId="{D65855CC-5EAA-455A-BED4-E611C5BA03BB}" srcOrd="0" destOrd="0" presId="urn:microsoft.com/office/officeart/2005/8/layout/process5"/>
+    <dgm:cxn modelId="{FDFCE99B-9942-44DE-A877-6745FC65B888}" srcId="{46294476-EBC3-4585-A1D4-AFEB26E81FA8}" destId="{27604B0E-F101-4866-87CF-8F000CB2E483}" srcOrd="0" destOrd="0" parTransId="{8A962511-4115-44F3-8626-2C4C20FF4B84}" sibTransId="{3508E934-413A-4C30-A27A-91CF65273019}"/>
+    <dgm:cxn modelId="{FF5A506F-D271-477C-A3BF-6D86934E8392}" srcId="{46294476-EBC3-4585-A1D4-AFEB26E81FA8}" destId="{3B7F35E3-D35F-4E9A-9D4A-210DA025A0F0}" srcOrd="4" destOrd="0" parTransId="{4DCD760E-D691-4413-BB4E-8CBC6DD04CA6}" sibTransId="{A979148E-58DE-4F39-A2D3-C4FB9A083EF9}"/>
+    <dgm:cxn modelId="{BC292721-396A-43DD-8366-3F77EA639F99}" type="presOf" srcId="{3508E934-413A-4C30-A27A-91CF65273019}" destId="{CFECC4BC-D11B-4A3A-AF9E-37071EE51EC8}" srcOrd="0" destOrd="0" presId="urn:microsoft.com/office/officeart/2005/8/layout/process5"/>
+    <dgm:cxn modelId="{445BD231-4DE1-4396-93FD-98F3873501FF}" type="presOf" srcId="{06142C71-73D2-4457-B990-03D5273DBD5E}" destId="{266A6F8B-BD19-4CA1-8F69-3ECDE410FB8E}" srcOrd="0" destOrd="0" presId="urn:microsoft.com/office/officeart/2005/8/layout/process5"/>
+    <dgm:cxn modelId="{7B4B85ED-0078-4E38-9902-EC48142DE929}" type="presOf" srcId="{A979148E-58DE-4F39-A2D3-C4FB9A083EF9}" destId="{1BBA0522-5533-4FC3-A641-AC225D16844B}" srcOrd="0" destOrd="0" presId="urn:microsoft.com/office/officeart/2005/8/layout/process5"/>
     <dgm:cxn modelId="{3D61A4F3-5F89-4A21-A99D-80A918CA7750}" type="presOf" srcId="{0C8489BF-5B3B-4F4D-82B9-2A8ED6A33555}" destId="{AD4CFFF8-DE9E-4B85-98A2-07CC9CD1834E}" srcOrd="0" destOrd="0" presId="urn:microsoft.com/office/officeart/2005/8/layout/process5"/>
-    <dgm:cxn modelId="{483F018F-A4FE-4E83-92C5-B7A935B365B5}" type="presOf" srcId="{3508E934-413A-4C30-A27A-91CF65273019}" destId="{CAC7E472-CD66-4791-AA50-4E093276C9C0}" srcOrd="1" destOrd="0" presId="urn:microsoft.com/office/officeart/2005/8/layout/process5"/>
-    <dgm:cxn modelId="{BC292721-396A-43DD-8366-3F77EA639F99}" type="presOf" srcId="{3508E934-413A-4C30-A27A-91CF65273019}" destId="{CFECC4BC-D11B-4A3A-AF9E-37071EE51EC8}" srcOrd="0" destOrd="0" presId="urn:microsoft.com/office/officeart/2005/8/layout/process5"/>
-    <dgm:cxn modelId="{F53046DE-E516-4068-8692-6D57137E26A2}" srcId="{46294476-EBC3-4585-A1D4-AFEB26E81FA8}" destId="{0C8489BF-5B3B-4F4D-82B9-2A8ED6A33555}" srcOrd="5" destOrd="0" parTransId="{F5F8D56A-447C-4E62-879F-5DCB389B4DC9}" sibTransId="{AE67F6A8-1921-4B9D-A569-D30F6B2CFA90}"/>
-    <dgm:cxn modelId="{FF5A506F-D271-477C-A3BF-6D86934E8392}" srcId="{46294476-EBC3-4585-A1D4-AFEB26E81FA8}" destId="{3B7F35E3-D35F-4E9A-9D4A-210DA025A0F0}" srcOrd="4" destOrd="0" parTransId="{4DCD760E-D691-4413-BB4E-8CBC6DD04CA6}" sibTransId="{A979148E-58DE-4F39-A2D3-C4FB9A083EF9}"/>
-    <dgm:cxn modelId="{0FE0F3B0-C6BC-432D-8C36-95066C6DDA4A}" type="presOf" srcId="{8190FA22-BEAD-4725-8BB8-9BF485F358F8}" destId="{48F045BD-0FA8-4875-8C34-CA481ECE6C59}" srcOrd="0" destOrd="0" presId="urn:microsoft.com/office/officeart/2005/8/layout/process5"/>
-    <dgm:cxn modelId="{9CD242BE-7699-4B50-8BC9-ABA6B6C20349}" srcId="{46294476-EBC3-4585-A1D4-AFEB26E81FA8}" destId="{F98F64DC-5C79-47C2-85CB-34B007AC568C}" srcOrd="2" destOrd="0" parTransId="{0CD1AB90-077B-40A8-B908-18532FC0FB31}" sibTransId="{05E30910-C2ED-4BBE-91A8-DDEC4503E85A}"/>
-    <dgm:cxn modelId="{AF75CF08-AC42-44AE-875C-8F9DBE620CD7}" type="presOf" srcId="{A979148E-58DE-4F39-A2D3-C4FB9A083EF9}" destId="{BD004D4B-C15A-48AE-8345-BA2C66903EBF}" srcOrd="1" destOrd="0" presId="urn:microsoft.com/office/officeart/2005/8/layout/process5"/>
     <dgm:cxn modelId="{56A6B794-64D8-4A9B-8508-0C3CF13E8166}" type="presParOf" srcId="{96CC5194-ED48-4286-AB7D-84D0C8A0D8D7}" destId="{0AE25DDD-6D4A-4484-BB9E-CF8F071F96B7}" srcOrd="0" destOrd="0" presId="urn:microsoft.com/office/officeart/2005/8/layout/process5"/>
     <dgm:cxn modelId="{06DA0ABA-F66B-45E2-8A5B-66DEFDE04AC8}" type="presParOf" srcId="{96CC5194-ED48-4286-AB7D-84D0C8A0D8D7}" destId="{CFECC4BC-D11B-4A3A-AF9E-37071EE51EC8}" srcOrd="1" destOrd="0" presId="urn:microsoft.com/office/officeart/2005/8/layout/process5"/>
     <dgm:cxn modelId="{FDD9120F-55AB-431F-8B5A-03CC045EC9FE}" type="presParOf" srcId="{CFECC4BC-D11B-4A3A-AF9E-37071EE51EC8}" destId="{CAC7E472-CD66-4791-AA50-4E093276C9C0}" srcOrd="0" destOrd="0" presId="urn:microsoft.com/office/officeart/2005/8/layout/process5"/>
@@ -2079,19 +2061,7 @@
             <a:rPr lang="en-US" sz="1800" kern="1200" dirty="0" smtClean="0">
               <a:latin typeface="Concert One" panose="020B0604020202020204" charset="0"/>
             </a:rPr>
-            <a:t>We </a:t>
-          </a:r>
-          <a:r>
-            <a:rPr lang="en-US" sz="1800" kern="1200" dirty="0" smtClean="0">
-              <a:latin typeface="Concert One" panose="020B0604020202020204" charset="0"/>
-            </a:rPr>
-            <a:t>created </a:t>
-          </a:r>
-          <a:r>
-            <a:rPr lang="en-US" sz="1800" kern="1200" dirty="0" smtClean="0">
-              <a:latin typeface="Concert One" panose="020B0604020202020204" charset="0"/>
-            </a:rPr>
-            <a:t>a logo</a:t>
+            <a:t>We created a logo</a:t>
           </a:r>
           <a:endParaRPr lang="en-US" sz="1800" kern="1200" dirty="0">
             <a:latin typeface="Concert One" panose="020B0604020202020204" charset="0"/>
@@ -2562,13 +2532,7 @@
             <a:rPr lang="en-US" sz="1800" kern="1200" smtClean="0">
               <a:latin typeface="Concert One" panose="020B0604020202020204" charset="0"/>
             </a:rPr>
-            <a:t>We </a:t>
-          </a:r>
-          <a:r>
-            <a:rPr lang="en-US" sz="1800" kern="1200" smtClean="0">
-              <a:latin typeface="Concert One" panose="020B0604020202020204" charset="0"/>
-            </a:rPr>
-            <a:t>created </a:t>
+            <a:t>We created </a:t>
           </a:r>
           <a:r>
             <a:rPr lang="en-US" sz="1800" kern="1200" dirty="0" smtClean="0">
@@ -21717,42 +21681,12 @@
       </p:sp>
       <p:pic>
         <p:nvPicPr>
-          <p:cNvPr id="6" name="Picture 5"/>
-          <p:cNvPicPr>
-            <a:picLocks noChangeAspect="1"/>
-          </p:cNvPicPr>
-          <p:nvPr/>
-        </p:nvPicPr>
-        <p:blipFill>
-          <a:blip r:embed="rId2">
-            <a:extLst>
-              <a:ext uri="{28A0092B-C50C-407E-A947-70E740481C1C}">
-                <a14:useLocalDpi xmlns:a14="http://schemas.microsoft.com/office/drawing/2010/main" val="0"/>
-              </a:ext>
-            </a:extLst>
-          </a:blip>
-          <a:stretch>
-            <a:fillRect/>
-          </a:stretch>
-        </p:blipFill>
-        <p:spPr>
-          <a:xfrm>
-            <a:off x="1768839" y="1081678"/>
-            <a:ext cx="5606321" cy="2835929"/>
-          </a:xfrm>
-          <a:prstGeom prst="rect">
-            <a:avLst/>
-          </a:prstGeom>
-        </p:spPr>
-      </p:pic>
-      <p:pic>
-        <p:nvPicPr>
           <p:cNvPr id="4" name="Google Shape;214;p39"/>
           <p:cNvPicPr preferRelativeResize="0"/>
           <p:nvPr/>
         </p:nvPicPr>
         <p:blipFill>
-          <a:blip r:embed="rId3">
+          <a:blip r:embed="rId2">
             <a:alphaModFix/>
           </a:blip>
           <a:stretch>
@@ -21780,7 +21714,7 @@
           <p:nvPr/>
         </p:nvPicPr>
         <p:blipFill>
-          <a:blip r:embed="rId4">
+          <a:blip r:embed="rId3">
             <a:alphaModFix/>
           </a:blip>
           <a:stretch>
@@ -21799,6 +21733,36 @@
           <a:ln>
             <a:noFill/>
           </a:ln>
+        </p:spPr>
+      </p:pic>
+      <p:pic>
+        <p:nvPicPr>
+          <p:cNvPr id="2" name="Picture 1"/>
+          <p:cNvPicPr>
+            <a:picLocks noChangeAspect="1"/>
+          </p:cNvPicPr>
+          <p:nvPr/>
+        </p:nvPicPr>
+        <p:blipFill>
+          <a:blip r:embed="rId4">
+            <a:extLst>
+              <a:ext uri="{28A0092B-C50C-407E-A947-70E740481C1C}">
+                <a14:useLocalDpi xmlns:a14="http://schemas.microsoft.com/office/drawing/2010/main" val="0"/>
+              </a:ext>
+            </a:extLst>
+          </a:blip>
+          <a:stretch>
+            <a:fillRect/>
+          </a:stretch>
+        </p:blipFill>
+        <p:spPr>
+          <a:xfrm>
+            <a:off x="2814911" y="998704"/>
+            <a:ext cx="3514178" cy="3978930"/>
+          </a:xfrm>
+          <a:prstGeom prst="rect">
+            <a:avLst/>
+          </a:prstGeom>
         </p:spPr>
       </p:pic>
     </p:spTree>
@@ -22558,7 +22522,7 @@
           <a:p>
             <a:pPr algn="ctr"/>
             <a:r>
-              <a:rPr lang="en-US" sz="4800" b="1" dirty="0" smtClean="0">
+              <a:rPr lang="en-US" sz="4800" b="1" dirty="0">
                 <a:effectLst>
                   <a:outerShdw blurRad="38100" dist="38100" dir="2700000" algn="tl">
                     <a:srgbClr val="000000">
@@ -22567,32 +22531,9 @@
                   </a:outerShdw>
                 </a:effectLst>
               </a:rPr>
-              <a:t>THANK YOU FOR </a:t>
+              <a:t>Now let us guide you to our game!</a:t>
             </a:r>
-            <a:br>
-              <a:rPr lang="en-US" sz="4800" b="1" dirty="0" smtClean="0">
-                <a:effectLst>
-                  <a:outerShdw blurRad="38100" dist="38100" dir="2700000" algn="tl">
-                    <a:srgbClr val="000000">
-                      <a:alpha val="43137"/>
-                    </a:srgbClr>
-                  </a:outerShdw>
-                </a:effectLst>
-              </a:rPr>
-            </a:br>
-            <a:r>
-              <a:rPr lang="en-US" sz="4800" b="1" dirty="0" smtClean="0">
-                <a:effectLst>
-                  <a:outerShdw blurRad="38100" dist="38100" dir="2700000" algn="tl">
-                    <a:srgbClr val="000000">
-                      <a:alpha val="43137"/>
-                    </a:srgbClr>
-                  </a:outerShdw>
-                </a:effectLst>
-              </a:rPr>
-              <a:t>YOUR ATTENTION!</a:t>
-            </a:r>
-            <a:endParaRPr lang="bg-BG" sz="4800" b="1" dirty="0">
+            <a:endParaRPr lang="bg-BG" sz="7200" b="1" dirty="0">
               <a:effectLst>
                 <a:outerShdw blurRad="38100" dist="38100" dir="2700000" algn="tl">
                   <a:srgbClr val="000000">

</xml_diff>